<commit_message>
style changes, added blog on harness and draft updates
</commit_message>
<xml_diff>
--- a/presentations/ABCS.pptx
+++ b/presentations/ABCS.pptx
@@ -5,10 +5,10 @@
     <p:sldMasterId id="2147483648" r:id="rId1"/>
   </p:sldMasterIdLst>
   <p:notesMasterIdLst>
-    <p:notesMasterId r:id="rId14"/>
+    <p:notesMasterId r:id="rId15"/>
   </p:notesMasterIdLst>
   <p:handoutMasterIdLst>
-    <p:handoutMasterId r:id="rId15"/>
+    <p:handoutMasterId r:id="rId16"/>
   </p:handoutMasterIdLst>
   <p:sldIdLst>
     <p:sldId id="256" r:id="rId2"/>
@@ -23,18 +23,19 @@
     <p:sldId id="268" r:id="rId11"/>
     <p:sldId id="269" r:id="rId12"/>
     <p:sldId id="270" r:id="rId13"/>
+    <p:sldId id="272" r:id="rId14"/>
   </p:sldIdLst>
   <p:sldSz cx="12192000" cy="6858000"/>
   <p:notesSz cx="6858000" cy="9144000"/>
   <p:embeddedFontLst>
     <p:embeddedFont>
       <p:font typeface="AA Zuehlke" panose="02000503060000020004" pitchFamily="2" charset="77"/>
-      <p:regular r:id="rId16"/>
-      <p:italic r:id="rId17"/>
+      <p:regular r:id="rId17"/>
+      <p:italic r:id="rId18"/>
     </p:embeddedFont>
   </p:embeddedFontLst>
   <p:custDataLst>
-    <p:tags r:id="rId18"/>
+    <p:tags r:id="rId19"/>
   </p:custDataLst>
   <p:defaultTextStyle>
     <a:defPPr>
@@ -275,7 +276,7 @@
               <a:rPr lang="de-DE" smtClean="0">
                 <a:latin typeface="AA Zuehlke" pitchFamily="2" charset="0"/>
               </a:rPr>
-              <a:t>26.09.20</a:t>
+              <a:t>11.12.20</a:t>
             </a:fld>
             <a:endParaRPr lang="de-DE">
               <a:latin typeface="AA Zuehlke" pitchFamily="2" charset="0"/>
@@ -453,7 +454,7 @@
             <a:fld id="{A6966AE6-B72D-4967-9CA3-8469D2863705}" type="datetimeFigureOut">
               <a:rPr lang="en-US" smtClean="0"/>
               <a:pPr/>
-              <a:t>9/26/20</a:t>
+              <a:t>12/11/20</a:t>
             </a:fld>
             <a:endParaRPr lang="en-US" dirty="0"/>
           </a:p>
@@ -2478,7 +2479,32 @@
               </a:rPr>
               <a:t>Intents are how we access most of these new concepts. Intents are used to start services, pass data, </a:t>
             </a:r>
-            <a:endParaRPr lang="en-US" dirty="0"/>
+          </a:p>
+          <a:p>
+            <a:endParaRPr lang="en-GB" sz="1200" b="0" i="0" kern="1200" dirty="0">
+              <a:solidFill>
+                <a:schemeClr val="tx1"/>
+              </a:solidFill>
+              <a:effectLst/>
+              <a:latin typeface="AA Zuehlke" pitchFamily="2" charset="0"/>
+              <a:ea typeface="+mn-ea"/>
+              <a:cs typeface="+mn-cs"/>
+            </a:endParaRPr>
+          </a:p>
+          <a:p>
+            <a:r>
+              <a:rPr lang="en-GB" sz="1200" b="1" i="0" kern="1200" dirty="0">
+                <a:solidFill>
+                  <a:schemeClr val="tx1"/>
+                </a:solidFill>
+                <a:effectLst/>
+                <a:latin typeface="AA Zuehlke" pitchFamily="2" charset="0"/>
+                <a:ea typeface="+mn-ea"/>
+                <a:cs typeface="+mn-cs"/>
+              </a:rPr>
+              <a:t>Fragments! Talk about Fragments!</a:t>
+            </a:r>
+            <a:endParaRPr lang="en-US" b="1" dirty="0"/>
           </a:p>
         </p:txBody>
       </p:sp>
@@ -7087,7 +7113,7 @@
           <a:p>
             <a:r>
               <a:rPr lang="en-GB" dirty="0"/>
-              <a:t>The ABC’s of Android: Learn Android in 20 Minutes</a:t>
+              <a:t>The ABC’s of Android: A quick start guide to learning Android</a:t>
             </a:r>
           </a:p>
         </p:txBody>
@@ -9739,6 +9765,319 @@
     <p:extLst>
       <p:ext uri="{BB962C8B-B14F-4D97-AF65-F5344CB8AC3E}">
         <p14:creationId xmlns:p14="http://schemas.microsoft.com/office/powerpoint/2010/main" val="1268169472"/>
+      </p:ext>
+    </p:extLst>
+  </p:cSld>
+  <p:clrMapOvr>
+    <a:masterClrMapping/>
+  </p:clrMapOvr>
+</p:sld>
+</file>
+
+<file path=ppt/slides/slide13.xml><?xml version="1.0" encoding="utf-8"?>
+<p:sld xmlns:a="http://schemas.openxmlformats.org/drawingml/2006/main" xmlns:r="http://schemas.openxmlformats.org/officeDocument/2006/relationships" xmlns:p="http://schemas.openxmlformats.org/presentationml/2006/main">
+  <p:cSld>
+    <p:spTree>
+      <p:nvGrpSpPr>
+        <p:cNvPr id="1" name=""/>
+        <p:cNvGrpSpPr/>
+        <p:nvPr/>
+      </p:nvGrpSpPr>
+      <p:grpSpPr>
+        <a:xfrm>
+          <a:off x="0" y="0"/>
+          <a:ext cx="0" cy="0"/>
+          <a:chOff x="0" y="0"/>
+          <a:chExt cx="0" cy="0"/>
+        </a:xfrm>
+      </p:grpSpPr>
+      <p:sp>
+        <p:nvSpPr>
+          <p:cNvPr id="2" name="Title 1">
+            <a:extLst>
+              <a:ext uri="{FF2B5EF4-FFF2-40B4-BE49-F238E27FC236}">
+                <a16:creationId xmlns:a16="http://schemas.microsoft.com/office/drawing/2014/main" id="{9C66F446-56DE-2741-AFDA-73356881306E}"/>
+              </a:ext>
+            </a:extLst>
+          </p:cNvPr>
+          <p:cNvSpPr>
+            <a:spLocks noGrp="1"/>
+          </p:cNvSpPr>
+          <p:nvPr>
+            <p:ph type="title"/>
+          </p:nvPr>
+        </p:nvSpPr>
+        <p:spPr/>
+        <p:txBody>
+          <a:bodyPr/>
+          <a:lstStyle/>
+          <a:p>
+            <a:r>
+              <a:rPr lang="en-US" dirty="0"/>
+              <a:t>What’s next?</a:t>
+            </a:r>
+          </a:p>
+        </p:txBody>
+      </p:sp>
+      <p:sp>
+        <p:nvSpPr>
+          <p:cNvPr id="3" name="Date Placeholder 2">
+            <a:extLst>
+              <a:ext uri="{FF2B5EF4-FFF2-40B4-BE49-F238E27FC236}">
+                <a16:creationId xmlns:a16="http://schemas.microsoft.com/office/drawing/2014/main" id="{1C3F91C1-7803-A144-9606-C5119CB95224}"/>
+              </a:ext>
+            </a:extLst>
+          </p:cNvPr>
+          <p:cNvSpPr>
+            <a:spLocks noGrp="1"/>
+          </p:cNvSpPr>
+          <p:nvPr>
+            <p:ph type="dt" sz="half" idx="10"/>
+          </p:nvPr>
+        </p:nvSpPr>
+        <p:spPr/>
+        <p:txBody>
+          <a:bodyPr/>
+          <a:lstStyle/>
+          <a:p>
+            <a:r>
+              <a:rPr lang="de-CH"/>
+              <a:t>7. January 2016</a:t>
+            </a:r>
+            <a:endParaRPr lang="de-CH" dirty="0"/>
+          </a:p>
+        </p:txBody>
+      </p:sp>
+      <p:sp>
+        <p:nvSpPr>
+          <p:cNvPr id="4" name="Footer Placeholder 3">
+            <a:extLst>
+              <a:ext uri="{FF2B5EF4-FFF2-40B4-BE49-F238E27FC236}">
+                <a16:creationId xmlns:a16="http://schemas.microsoft.com/office/drawing/2014/main" id="{6AC67073-EE61-B84A-AE4D-072AA01EFF0F}"/>
+              </a:ext>
+            </a:extLst>
+          </p:cNvPr>
+          <p:cNvSpPr>
+            <a:spLocks noGrp="1"/>
+          </p:cNvSpPr>
+          <p:nvPr>
+            <p:ph type="ftr" sz="quarter" idx="11"/>
+          </p:nvPr>
+        </p:nvSpPr>
+        <p:spPr/>
+        <p:txBody>
+          <a:bodyPr/>
+          <a:lstStyle/>
+          <a:p>
+            <a:r>
+              <a:rPr lang="de-CH"/>
+              <a:t>Empty Presentation</a:t>
+            </a:r>
+            <a:endParaRPr lang="de-CH" dirty="0"/>
+          </a:p>
+        </p:txBody>
+      </p:sp>
+      <p:sp>
+        <p:nvSpPr>
+          <p:cNvPr id="5" name="Slide Number Placeholder 4">
+            <a:extLst>
+              <a:ext uri="{FF2B5EF4-FFF2-40B4-BE49-F238E27FC236}">
+                <a16:creationId xmlns:a16="http://schemas.microsoft.com/office/drawing/2014/main" id="{8427C372-2312-4645-94D3-C72F0CF14920}"/>
+              </a:ext>
+            </a:extLst>
+          </p:cNvPr>
+          <p:cNvSpPr>
+            <a:spLocks noGrp="1"/>
+          </p:cNvSpPr>
+          <p:nvPr>
+            <p:ph type="sldNum" sz="quarter" idx="12"/>
+          </p:nvPr>
+        </p:nvSpPr>
+        <p:spPr/>
+        <p:txBody>
+          <a:bodyPr/>
+          <a:lstStyle/>
+          <a:p>
+            <a:r>
+              <a:rPr lang="de-CH"/>
+              <a:t>Slide </a:t>
+            </a:r>
+            <a:fld id="{F7FC1B4D-809A-4604-AEC2-CC9A5877171E}" type="slidenum">
+              <a:rPr smtClean="0"/>
+              <a:pPr/>
+              <a:t>13</a:t>
+            </a:fld>
+            <a:endParaRPr dirty="0"/>
+          </a:p>
+        </p:txBody>
+      </p:sp>
+      <p:sp>
+        <p:nvSpPr>
+          <p:cNvPr id="6" name="Text Placeholder 5">
+            <a:extLst>
+              <a:ext uri="{FF2B5EF4-FFF2-40B4-BE49-F238E27FC236}">
+                <a16:creationId xmlns:a16="http://schemas.microsoft.com/office/drawing/2014/main" id="{D056ECFE-55D5-C145-86BD-3404F46DF72A}"/>
+              </a:ext>
+            </a:extLst>
+          </p:cNvPr>
+          <p:cNvSpPr>
+            <a:spLocks noGrp="1"/>
+          </p:cNvSpPr>
+          <p:nvPr>
+            <p:ph type="body" sz="quarter" idx="13"/>
+          </p:nvPr>
+        </p:nvSpPr>
+        <p:spPr/>
+        <p:txBody>
+          <a:bodyPr/>
+          <a:lstStyle/>
+          <a:p>
+            <a:r>
+              <a:rPr lang="en-US" dirty="0"/>
+              <a:t>Learning never really ends</a:t>
+            </a:r>
+          </a:p>
+        </p:txBody>
+      </p:sp>
+      <p:sp>
+        <p:nvSpPr>
+          <p:cNvPr id="7" name="Picture Placeholder 6">
+            <a:extLst>
+              <a:ext uri="{FF2B5EF4-FFF2-40B4-BE49-F238E27FC236}">
+                <a16:creationId xmlns:a16="http://schemas.microsoft.com/office/drawing/2014/main" id="{E51186B0-12E2-E143-9AB0-7CFF6D7081C1}"/>
+              </a:ext>
+            </a:extLst>
+          </p:cNvPr>
+          <p:cNvSpPr>
+            <a:spLocks noGrp="1"/>
+          </p:cNvSpPr>
+          <p:nvPr>
+            <p:ph type="pic" sz="quarter" idx="14"/>
+          </p:nvPr>
+        </p:nvSpPr>
+        <p:spPr/>
+      </p:sp>
+      <p:sp>
+        <p:nvSpPr>
+          <p:cNvPr id="8" name="Picture Placeholder 7">
+            <a:extLst>
+              <a:ext uri="{FF2B5EF4-FFF2-40B4-BE49-F238E27FC236}">
+                <a16:creationId xmlns:a16="http://schemas.microsoft.com/office/drawing/2014/main" id="{87814B9B-F96F-C14B-B943-13F2D7863A5C}"/>
+              </a:ext>
+            </a:extLst>
+          </p:cNvPr>
+          <p:cNvSpPr>
+            <a:spLocks noGrp="1"/>
+          </p:cNvSpPr>
+          <p:nvPr>
+            <p:ph type="pic" sz="quarter" idx="15"/>
+          </p:nvPr>
+        </p:nvSpPr>
+        <p:spPr/>
+      </p:sp>
+      <p:sp>
+        <p:nvSpPr>
+          <p:cNvPr id="9" name="Picture Placeholder 8">
+            <a:extLst>
+              <a:ext uri="{FF2B5EF4-FFF2-40B4-BE49-F238E27FC236}">
+                <a16:creationId xmlns:a16="http://schemas.microsoft.com/office/drawing/2014/main" id="{9F4AF0A3-0783-D745-A9EB-8847F5CD10AD}"/>
+              </a:ext>
+            </a:extLst>
+          </p:cNvPr>
+          <p:cNvSpPr>
+            <a:spLocks noGrp="1"/>
+          </p:cNvSpPr>
+          <p:nvPr>
+            <p:ph type="pic" sz="quarter" idx="16"/>
+          </p:nvPr>
+        </p:nvSpPr>
+        <p:spPr/>
+      </p:sp>
+      <p:sp>
+        <p:nvSpPr>
+          <p:cNvPr id="10" name="Content Placeholder 9">
+            <a:extLst>
+              <a:ext uri="{FF2B5EF4-FFF2-40B4-BE49-F238E27FC236}">
+                <a16:creationId xmlns:a16="http://schemas.microsoft.com/office/drawing/2014/main" id="{68EEF616-AADD-E449-8216-0FFC1D3CB863}"/>
+              </a:ext>
+            </a:extLst>
+          </p:cNvPr>
+          <p:cNvSpPr>
+            <a:spLocks noGrp="1"/>
+          </p:cNvSpPr>
+          <p:nvPr>
+            <p:ph idx="1"/>
+          </p:nvPr>
+        </p:nvSpPr>
+        <p:spPr/>
+        <p:txBody>
+          <a:bodyPr/>
+          <a:lstStyle/>
+          <a:p>
+            <a:pPr marL="342900" indent="-342900">
+              <a:buFont typeface="Arial" panose="020B0604020202020204" pitchFamily="34" charset="0"/>
+              <a:buChar char="•"/>
+            </a:pPr>
+            <a:r>
+              <a:rPr lang="en-US" dirty="0"/>
+              <a:t>Coroutines</a:t>
+            </a:r>
+          </a:p>
+          <a:p>
+            <a:pPr marL="342900" indent="-342900">
+              <a:buFont typeface="Arial" panose="020B0604020202020204" pitchFamily="34" charset="0"/>
+              <a:buChar char="•"/>
+            </a:pPr>
+            <a:r>
+              <a:rPr lang="en-US" dirty="0"/>
+              <a:t>Fragments</a:t>
+            </a:r>
+          </a:p>
+          <a:p>
+            <a:pPr marL="342900" indent="-342900">
+              <a:buFont typeface="Arial" panose="020B0604020202020204" pitchFamily="34" charset="0"/>
+              <a:buChar char="•"/>
+            </a:pPr>
+            <a:r>
+              <a:rPr lang="en-US" dirty="0" err="1"/>
+              <a:t>ViewModels</a:t>
+            </a:r>
+            <a:r>
+              <a:rPr lang="en-US" dirty="0"/>
+              <a:t> and </a:t>
+            </a:r>
+            <a:r>
+              <a:rPr lang="en-US" dirty="0" err="1"/>
+              <a:t>LiveData</a:t>
+            </a:r>
+            <a:endParaRPr lang="en-US" dirty="0"/>
+          </a:p>
+          <a:p>
+            <a:pPr marL="342900" indent="-342900">
+              <a:buFont typeface="Arial" panose="020B0604020202020204" pitchFamily="34" charset="0"/>
+              <a:buChar char="•"/>
+            </a:pPr>
+            <a:r>
+              <a:rPr lang="en-US" dirty="0"/>
+              <a:t>Dagger / Hilt</a:t>
+            </a:r>
+          </a:p>
+          <a:p>
+            <a:pPr marL="342900" indent="-342900">
+              <a:buFont typeface="Arial" panose="020B0604020202020204" pitchFamily="34" charset="0"/>
+              <a:buChar char="•"/>
+            </a:pPr>
+            <a:r>
+              <a:rPr lang="en-US" dirty="0"/>
+              <a:t>Jetpack Compose</a:t>
+            </a:r>
+          </a:p>
+        </p:txBody>
+      </p:sp>
+    </p:spTree>
+    <p:extLst>
+      <p:ext uri="{BB962C8B-B14F-4D97-AF65-F5344CB8AC3E}">
+        <p14:creationId xmlns:p14="http://schemas.microsoft.com/office/powerpoint/2010/main" val="4202066441"/>
       </p:ext>
     </p:extLst>
   </p:cSld>

</xml_diff>